<commit_message>
+ minor note and ref
</commit_message>
<xml_diff>
--- a/Discovery.pptx
+++ b/Discovery.pptx
@@ -20876,7 +20876,7 @@
         </p:nvSpPr>
         <p:spPr>
           <a:xfrm>
-            <a:off x="177801" y="4737154"/>
+            <a:off x="177801" y="4543969"/>
             <a:ext cx="14857362" cy="2026544"/>
           </a:xfrm>
           <a:prstGeom prst="rect">
@@ -22896,7 +22896,7 @@
         </p:nvSpPr>
         <p:spPr>
           <a:xfrm>
-            <a:off x="919415" y="6873498"/>
+            <a:off x="919415" y="6448491"/>
             <a:ext cx="12604666" cy="1600438"/>
           </a:xfrm>
           <a:prstGeom prst="rect">
@@ -23079,6 +23079,64 @@
           </a:p>
           <a:p>
             <a:endParaRPr lang="ru-RU" dirty="0"/>
+          </a:p>
+        </p:txBody>
+      </p:sp>
+      <p:sp>
+        <p:nvSpPr>
+          <p:cNvPr id="3" name="TextBox 2">
+            <a:extLst>
+              <a:ext uri="{FF2B5EF4-FFF2-40B4-BE49-F238E27FC236}">
+                <a16:creationId xmlns:a16="http://schemas.microsoft.com/office/drawing/2014/main" id="{247F0EFE-FE7B-2642-A7F0-16C0A4F7A6AA}"/>
+              </a:ext>
+            </a:extLst>
+          </p:cNvPr>
+          <p:cNvSpPr txBox="1"/>
+          <p:nvPr/>
+        </p:nvSpPr>
+        <p:spPr>
+          <a:xfrm>
+            <a:off x="177801" y="8035683"/>
+            <a:ext cx="13938791" cy="338554"/>
+          </a:xfrm>
+          <a:prstGeom prst="rect">
+            <a:avLst/>
+          </a:prstGeom>
+          <a:noFill/>
+        </p:spPr>
+        <p:txBody>
+          <a:bodyPr wrap="square" rtlCol="0">
+            <a:spAutoFit/>
+          </a:bodyPr>
+          <a:lstStyle/>
+          <a:p>
+            <a:pPr marL="285750" indent="-285750">
+              <a:buFont typeface="Arial" panose="020B0604020202020204" pitchFamily="34" charset="0"/>
+              <a:buChar char="•"/>
+            </a:pPr>
+            <a:r>
+              <a:rPr lang="en-US" sz="1600" dirty="0"/>
+              <a:t>Of course, these parameters change total reaction time to process </a:t>
+            </a:r>
+            <a:r>
+              <a:rPr lang="en-US" sz="1600"/>
+              <a:t>node failure </a:t>
+            </a:r>
+            <a:r>
+              <a:rPr lang="en-US" sz="1600" dirty="0"/>
+              <a:t>(see page </a:t>
+            </a:r>
+            <a:r>
+              <a:rPr lang="en-US" sz="1600" dirty="0">
+                <a:hlinkClick r:id="rId3" action="ppaction://hlinksldjump"/>
+              </a:rPr>
+              <a:t>#13, 'Node failure processing #4'</a:t>
+            </a:r>
+            <a:r>
+              <a:rPr lang="en-US" sz="1600" dirty="0"/>
+              <a:t>).</a:t>
+            </a:r>
+            <a:endParaRPr lang="ru-RU" sz="1600" dirty="0"/>
           </a:p>
         </p:txBody>
       </p:sp>

</xml_diff>

<commit_message>
+ better desc. of ping rate
</commit_message>
<xml_diff>
--- a/Discovery.pptx
+++ b/Discovery.pptx
@@ -21185,10 +21185,10 @@
           </p:nvGrpSpPr>
           <p:grpSpPr>
             <a:xfrm>
-              <a:off x="649941" y="1798431"/>
-              <a:ext cx="14541094" cy="2870497"/>
-              <a:chOff x="649941" y="1976231"/>
-              <a:chExt cx="14541094" cy="2870497"/>
+              <a:off x="405239" y="1798431"/>
+              <a:ext cx="14785796" cy="2870497"/>
+              <a:chOff x="405239" y="1976231"/>
+              <a:chExt cx="14785796" cy="2870497"/>
             </a:xfrm>
           </p:grpSpPr>
           <p:cxnSp>
@@ -22418,8 +22418,8 @@
             </p:nvSpPr>
             <p:spPr>
               <a:xfrm>
-                <a:off x="649941" y="4036994"/>
-                <a:ext cx="2358540" cy="495300"/>
+                <a:off x="405239" y="4036993"/>
+                <a:ext cx="3329209" cy="662363"/>
               </a:xfrm>
               <a:prstGeom prst="rect">
                 <a:avLst/>
@@ -22446,7 +22446,23 @@
                 </a:pPr>
                 <a:r>
                   <a:rPr lang="en-US" sz="1200" dirty="0"/>
-                  <a:t>Some delay. Equal to ping frequency at most.</a:t>
+                  <a:t>Some delay. Equal to ping frequency at most. In case of this extended configuration ping rate =  ( </a:t>
+                </a:r>
+                <a:r>
+                  <a:rPr lang="en-US" sz="1200" dirty="0" err="1"/>
+                  <a:t>sockTimeout</a:t>
+                </a:r>
+                <a:r>
+                  <a:rPr lang="en-US" sz="1200" dirty="0"/>
+                  <a:t> + </a:t>
+                </a:r>
+                <a:r>
+                  <a:rPr lang="en-US" sz="1200" dirty="0" err="1"/>
+                  <a:t>ackTimeout</a:t>
+                </a:r>
+                <a:r>
+                  <a:rPr lang="en-US" sz="1200" dirty="0"/>
+                  <a:t>) / 3.</a:t>
                 </a:r>
                 <a:endParaRPr sz="1200" dirty="0"/>
               </a:p>

</xml_diff>

<commit_message>
more accurate conn. recovery descruption
</commit_message>
<xml_diff>
--- a/Discovery.pptx
+++ b/Discovery.pptx
@@ -14915,26 +14915,6 @@
               </a:spcAft>
               <a:buNone/>
             </a:pPr>
-            <a:r>
-              <a:rPr lang="en" sz="1600" dirty="0"/>
-              <a:t>By default </a:t>
-            </a:r>
-            <a:r>
-              <a:rPr lang="en" sz="1600" i="1" u="sng" dirty="0" err="1"/>
-              <a:t>connectionRecoveryTimeout</a:t>
-            </a:r>
-            <a:r>
-              <a:rPr lang="en" sz="1600" u="sng" dirty="0"/>
-              <a:t> = </a:t>
-            </a:r>
-            <a:r>
-              <a:rPr lang="en" sz="1600" i="1" u="sng" dirty="0" err="1"/>
-              <a:t>failureDetectionTimeout</a:t>
-            </a:r>
-            <a:r>
-              <a:rPr lang="en" sz="1600" i="1" dirty="0"/>
-              <a:t>.</a:t>
-            </a:r>
             <a:endParaRPr sz="1600" dirty="0"/>
           </a:p>
         </p:txBody>
@@ -15198,8 +15178,8 @@
         </p:nvSpPr>
         <p:spPr>
           <a:xfrm>
-            <a:off x="8446148" y="4278750"/>
-            <a:ext cx="6793852" cy="4293750"/>
+            <a:off x="8403149" y="4286250"/>
+            <a:ext cx="6793852" cy="3556920"/>
           </a:xfrm>
           <a:prstGeom prst="rect">
             <a:avLst/>
@@ -15270,7 +15250,7 @@
               <a:rPr lang="en" smtClean="0"/>
               <a:t>12</a:t>
             </a:fld>
-            <a:endParaRPr lang="en"/>
+            <a:endParaRPr lang="en" dirty="0"/>
           </a:p>
         </p:txBody>
       </p:sp>
@@ -16398,12 +16378,32 @@
             </a:pPr>
             <a:r>
               <a:rPr lang="en" sz="1600" b="1" dirty="0"/>
-              <a:t>Basic formula </a:t>
+              <a:t>Basic </a:t>
+            </a:r>
+            <a:r>
+              <a:rPr lang="en" sz="1600" b="1" dirty="0" err="1"/>
+              <a:t>forrmula</a:t>
+            </a:r>
+            <a:r>
+              <a:rPr lang="en" sz="1600" b="1" dirty="0"/>
+              <a:t> </a:t>
             </a:r>
             <a:r>
               <a:rPr lang="en" sz="1600" dirty="0"/>
-              <a:t>to figure out delay to process node failure is:</a:t>
-            </a:r>
+              <a:t>of node failure processing delay is:</a:t>
+            </a:r>
+          </a:p>
+          <a:p>
+            <a:pPr marL="0" lvl="0" indent="0" algn="l" rtl="0">
+              <a:spcBef>
+                <a:spcPts val="0"/>
+              </a:spcBef>
+              <a:spcAft>
+                <a:spcPts val="0"/>
+              </a:spcAft>
+              <a:buNone/>
+            </a:pPr>
+            <a:endParaRPr lang="en" sz="1600" dirty="0"/>
           </a:p>
           <a:p>
             <a:pPr algn="ctr"/>
@@ -16417,9 +16417,13 @@
             </a:r>
             <a:r>
               <a:rPr lang="en-US" sz="2000" i="1" dirty="0"/>
-              <a:t> * 2</a:t>
-            </a:r>
-            <a:endParaRPr lang="en" sz="2000" i="1" dirty="0"/>
+              <a:t> + </a:t>
+            </a:r>
+            <a:r>
+              <a:rPr lang="en-US" sz="2000" i="1" dirty="0" err="1"/>
+              <a:t>connRecoveryTimeout</a:t>
+            </a:r>
+            <a:endParaRPr sz="2000" i="1" dirty="0"/>
           </a:p>
           <a:p>
             <a:pPr marL="0" lvl="0" indent="0" algn="l" rtl="0">
@@ -16431,58 +16435,73 @@
               </a:spcAft>
               <a:buNone/>
             </a:pPr>
-            <a:endParaRPr lang="en" sz="1600" i="1" dirty="0"/>
-          </a:p>
-          <a:p>
-            <a:pPr lvl="0"/>
-            <a:r>
-              <a:rPr lang="en-US" sz="1600" dirty="0"/>
-              <a:t>Because </a:t>
-            </a:r>
-            <a:r>
-              <a:rPr lang="en-US" sz="1600" dirty="0" err="1"/>
-              <a:t>connectionRecoveryTimeout</a:t>
-            </a:r>
-            <a:r>
-              <a:rPr lang="en-US" sz="1600" dirty="0"/>
-              <a:t> = </a:t>
-            </a:r>
-            <a:r>
-              <a:rPr lang="en-US" sz="1600" i="1" dirty="0" err="1"/>
-              <a:t>failureDetectionTimeout</a:t>
-            </a:r>
-            <a:r>
-              <a:rPr lang="en-US" sz="1600" dirty="0"/>
-              <a:t> by default. If </a:t>
-            </a:r>
-            <a:r>
-              <a:rPr lang="en-US" sz="1600" i="1" dirty="0" err="1"/>
-              <a:t>connectionRecoveryTimeout</a:t>
-            </a:r>
-            <a:r>
-              <a:rPr lang="en-US" sz="1600" dirty="0"/>
-              <a:t> is set:</a:t>
+            <a:endParaRPr lang="en" sz="1600" b="1" dirty="0"/>
+          </a:p>
+          <a:p>
+            <a:pPr marL="0" lvl="0" indent="0" algn="l" rtl="0">
+              <a:spcBef>
+                <a:spcPts val="0"/>
+              </a:spcBef>
+              <a:spcAft>
+                <a:spcPts val="0"/>
+              </a:spcAft>
+              <a:buNone/>
+            </a:pPr>
+            <a:endParaRPr lang="en" sz="1600" b="1" dirty="0"/>
+          </a:p>
+          <a:p>
+            <a:pPr marL="0" lvl="0" indent="0" algn="l" rtl="0">
+              <a:spcBef>
+                <a:spcPts val="0"/>
+              </a:spcBef>
+              <a:spcAft>
+                <a:spcPts val="0"/>
+              </a:spcAft>
+              <a:buNone/>
+            </a:pPr>
+            <a:r>
+              <a:rPr lang="en" sz="1600" b="1" u="sng" dirty="0"/>
+              <a:t>Real estimation</a:t>
+            </a:r>
+            <a:r>
+              <a:rPr lang="en" sz="1600" dirty="0"/>
+              <a:t> is worst. To notify the cluster about detected node failure, </a:t>
+            </a:r>
+            <a:r>
+              <a:rPr lang="en" sz="1600" i="1" dirty="0" err="1"/>
+              <a:t>NodeFailed</a:t>
+            </a:r>
+            <a:r>
+              <a:rPr lang="en" sz="1600" dirty="0"/>
+              <a:t> message can run twice around the ring. The message meets delay on each node like GC, CPU lack and network issues. Let’s name this affection ‘</a:t>
+            </a:r>
+            <a:r>
+              <a:rPr lang="en" sz="1600" dirty="0" err="1"/>
+              <a:t>node_delay</a:t>
+            </a:r>
+            <a:r>
+              <a:rPr lang="en" sz="1600" dirty="0"/>
+              <a:t>’. </a:t>
+            </a:r>
+            <a:r>
+              <a:rPr lang="en" sz="1600" dirty="0" err="1"/>
+              <a:t>Overal</a:t>
+            </a:r>
+            <a:r>
+              <a:rPr lang="en" sz="1600" dirty="0"/>
+              <a:t> delay would be:</a:t>
             </a:r>
             <a:endParaRPr sz="1600" dirty="0"/>
           </a:p>
           <a:p>
-            <a:pPr marL="0" lvl="0" indent="0" algn="l" rtl="0">
-              <a:spcBef>
-                <a:spcPts val="0"/>
-              </a:spcBef>
-              <a:spcAft>
-                <a:spcPts val="0"/>
-              </a:spcAft>
-              <a:buNone/>
-            </a:pPr>
-            <a:endParaRPr lang="en-US" sz="1000" i="1" dirty="0"/>
-          </a:p>
-          <a:p>
-            <a:pPr lvl="0" algn="ctr"/>
-            <a:r>
-              <a:rPr lang="en-US" sz="1600" i="1" dirty="0"/>
+            <a:pPr algn="ctr"/>
+            <a:r>
+              <a:rPr lang="en-US" sz="2000" i="1" dirty="0"/>
               <a:t> </a:t>
             </a:r>
+          </a:p>
+          <a:p>
+            <a:pPr algn="ctr"/>
             <a:r>
               <a:rPr lang="en-US" sz="2000" i="1" dirty="0" err="1"/>
               <a:t>failureDetectionTimeout</a:t>
@@ -16495,96 +16514,9 @@
               <a:rPr lang="en-US" sz="2000" i="1" dirty="0" err="1"/>
               <a:t>connRecoveryTimeout</a:t>
             </a:r>
-            <a:endParaRPr sz="2000" i="1" dirty="0"/>
-          </a:p>
-          <a:p>
-            <a:pPr marL="0" lvl="0" indent="0" algn="l" rtl="0">
-              <a:spcBef>
-                <a:spcPts val="0"/>
-              </a:spcBef>
-              <a:spcAft>
-                <a:spcPts val="0"/>
-              </a:spcAft>
-              <a:buNone/>
-            </a:pPr>
-            <a:endParaRPr lang="en" sz="1600" b="1" dirty="0"/>
-          </a:p>
-          <a:p>
-            <a:pPr marL="0" lvl="0" indent="0" algn="l" rtl="0">
-              <a:spcBef>
-                <a:spcPts val="0"/>
-              </a:spcBef>
-              <a:spcAft>
-                <a:spcPts val="0"/>
-              </a:spcAft>
-              <a:buNone/>
-            </a:pPr>
-            <a:endParaRPr lang="en" sz="1600" b="1" dirty="0"/>
-          </a:p>
-          <a:p>
-            <a:pPr marL="0" lvl="0" indent="0" algn="l" rtl="0">
-              <a:spcBef>
-                <a:spcPts val="0"/>
-              </a:spcBef>
-              <a:spcAft>
-                <a:spcPts val="0"/>
-              </a:spcAft>
-              <a:buNone/>
-            </a:pPr>
-            <a:r>
-              <a:rPr lang="en" sz="1800" b="1" u="sng" dirty="0"/>
-              <a:t>Real estimation</a:t>
-            </a:r>
-            <a:r>
-              <a:rPr lang="en" sz="1800" dirty="0"/>
-              <a:t> </a:t>
-            </a:r>
-            <a:r>
-              <a:rPr lang="en" sz="1600" dirty="0"/>
-              <a:t>is worst. To notify the cluster, </a:t>
-            </a:r>
-            <a:r>
-              <a:rPr lang="en" sz="1600" i="1" dirty="0" err="1"/>
-              <a:t>NodeFailed</a:t>
-            </a:r>
-            <a:r>
-              <a:rPr lang="en" sz="1600" dirty="0"/>
-              <a:t> message runs twice around the ring. The message meets delay on each node like GC, CPU lack and network issues. Let’s name this affection as ‘</a:t>
-            </a:r>
-            <a:r>
-              <a:rPr lang="en" sz="1600" dirty="0" err="1"/>
-              <a:t>node_delay</a:t>
-            </a:r>
-            <a:r>
-              <a:rPr lang="en" sz="1600" dirty="0"/>
-              <a:t>’:</a:t>
-            </a:r>
-            <a:endParaRPr sz="1600" dirty="0"/>
-          </a:p>
-          <a:p>
-            <a:pPr algn="ctr"/>
             <a:r>
               <a:rPr lang="en-US" sz="2000" i="1" dirty="0"/>
-              <a:t> </a:t>
-            </a:r>
-          </a:p>
-          <a:p>
-            <a:pPr algn="ctr"/>
-            <a:r>
-              <a:rPr lang="en-US" sz="2000" i="1" dirty="0" err="1"/>
-              <a:t>failureDetectionTimeout</a:t>
-            </a:r>
-            <a:r>
-              <a:rPr lang="en-US" sz="2000" i="1" dirty="0"/>
-              <a:t> + </a:t>
-            </a:r>
-            <a:r>
-              <a:rPr lang="en-US" sz="2000" i="1" dirty="0" err="1"/>
-              <a:t>connRecoveryTimeout</a:t>
-            </a:r>
-            <a:r>
-              <a:rPr lang="en-US" sz="2000" i="1" dirty="0"/>
-              <a:t>  + 2 * </a:t>
+              <a:t>  + 2 * (</a:t>
             </a:r>
             <a:r>
               <a:rPr lang="en-US" sz="2000" i="1" dirty="0" err="1"/>
@@ -16592,7 +16524,7 @@
             </a:r>
             <a:r>
               <a:rPr lang="en-US" sz="2000" i="1" dirty="0"/>
-              <a:t> * </a:t>
+              <a:t> -1) * </a:t>
             </a:r>
             <a:r>
               <a:rPr lang="en-US" sz="2000" i="1" dirty="0" err="1"/>
@@ -16723,7 +16655,7 @@
             </a:r>
             <a:r>
               <a:rPr lang="en-US" sz="2000" i="1" dirty="0"/>
-              <a:t>  + 2 * </a:t>
+              <a:t>  + 2 * (</a:t>
             </a:r>
             <a:r>
               <a:rPr lang="en-US" sz="2000" i="1" dirty="0" err="1"/>
@@ -16731,7 +16663,7 @@
             </a:r>
             <a:r>
               <a:rPr lang="en-US" sz="2000" i="1" dirty="0"/>
-              <a:t> * </a:t>
+              <a:t> -1) * </a:t>
             </a:r>
             <a:r>
               <a:rPr lang="en-US" sz="2000" i="1" dirty="0" err="1"/>
@@ -16903,7 +16835,7 @@
             </a:pPr>
             <a:r>
               <a:rPr lang="en" sz="1800" b="1" dirty="0"/>
-              <a:t>Worst reaction time</a:t>
+              <a:t>Reaction time</a:t>
             </a:r>
             <a:endParaRPr sz="1800" b="1" dirty="0"/>
           </a:p>
@@ -16993,8 +16925,8 @@
         </p:nvSpPr>
         <p:spPr>
           <a:xfrm>
-            <a:off x="8242300" y="5562600"/>
-            <a:ext cx="6667500" cy="776025"/>
+            <a:off x="8023500" y="6053070"/>
+            <a:ext cx="7011663" cy="1390919"/>
           </a:xfrm>
           <a:prstGeom prst="rect">
             <a:avLst/>

</xml_diff>